<commit_message>
pdf and ppt v2
</commit_message>
<xml_diff>
--- a/asm.pptx
+++ b/asm.pptx
@@ -331,7 +331,7 @@
             <a:fld id="{1D8BD707-D9CF-40AE-B4C6-C98DA3205C09}" type="datetimeFigureOut">
               <a:rPr lang="en-US" smtClean="0"/>
               <a:pPr/>
-              <a:t>1/8/2023</a:t>
+              <a:t>1/9/2023</a:t>
             </a:fld>
             <a:endParaRPr lang="en-US"/>
           </a:p>
@@ -496,7 +496,7 @@
             <a:fld id="{1D8BD707-D9CF-40AE-B4C6-C98DA3205C09}" type="datetimeFigureOut">
               <a:rPr lang="en-US" smtClean="0"/>
               <a:pPr/>
-              <a:t>1/8/2023</a:t>
+              <a:t>1/9/2023</a:t>
             </a:fld>
             <a:endParaRPr lang="en-US"/>
           </a:p>
@@ -671,7 +671,7 @@
             <a:fld id="{1D8BD707-D9CF-40AE-B4C6-C98DA3205C09}" type="datetimeFigureOut">
               <a:rPr lang="en-US" smtClean="0"/>
               <a:pPr/>
-              <a:t>1/8/2023</a:t>
+              <a:t>1/9/2023</a:t>
             </a:fld>
             <a:endParaRPr lang="en-US"/>
           </a:p>
@@ -836,7 +836,7 @@
             <a:fld id="{1D8BD707-D9CF-40AE-B4C6-C98DA3205C09}" type="datetimeFigureOut">
               <a:rPr lang="en-US" smtClean="0"/>
               <a:pPr/>
-              <a:t>1/8/2023</a:t>
+              <a:t>1/9/2023</a:t>
             </a:fld>
             <a:endParaRPr lang="en-US"/>
           </a:p>
@@ -1078,7 +1078,7 @@
             <a:fld id="{1D8BD707-D9CF-40AE-B4C6-C98DA3205C09}" type="datetimeFigureOut">
               <a:rPr lang="en-US" smtClean="0"/>
               <a:pPr/>
-              <a:t>1/8/2023</a:t>
+              <a:t>1/9/2023</a:t>
             </a:fld>
             <a:endParaRPr lang="en-US"/>
           </a:p>
@@ -1360,7 +1360,7 @@
             <a:fld id="{1D8BD707-D9CF-40AE-B4C6-C98DA3205C09}" type="datetimeFigureOut">
               <a:rPr lang="en-US" smtClean="0"/>
               <a:pPr/>
-              <a:t>1/8/2023</a:t>
+              <a:t>1/9/2023</a:t>
             </a:fld>
             <a:endParaRPr lang="en-US"/>
           </a:p>
@@ -1776,7 +1776,7 @@
             <a:fld id="{1D8BD707-D9CF-40AE-B4C6-C98DA3205C09}" type="datetimeFigureOut">
               <a:rPr lang="en-US" smtClean="0"/>
               <a:pPr/>
-              <a:t>1/8/2023</a:t>
+              <a:t>1/9/2023</a:t>
             </a:fld>
             <a:endParaRPr lang="en-US"/>
           </a:p>
@@ -1890,7 +1890,7 @@
             <a:fld id="{1D8BD707-D9CF-40AE-B4C6-C98DA3205C09}" type="datetimeFigureOut">
               <a:rPr lang="en-US" smtClean="0"/>
               <a:pPr/>
-              <a:t>1/8/2023</a:t>
+              <a:t>1/9/2023</a:t>
             </a:fld>
             <a:endParaRPr lang="en-US"/>
           </a:p>
@@ -1982,7 +1982,7 @@
             <a:fld id="{1D8BD707-D9CF-40AE-B4C6-C98DA3205C09}" type="datetimeFigureOut">
               <a:rPr lang="en-US" smtClean="0"/>
               <a:pPr/>
-              <a:t>1/8/2023</a:t>
+              <a:t>1/9/2023</a:t>
             </a:fld>
             <a:endParaRPr lang="en-US"/>
           </a:p>
@@ -2254,7 +2254,7 @@
             <a:fld id="{1D8BD707-D9CF-40AE-B4C6-C98DA3205C09}" type="datetimeFigureOut">
               <a:rPr lang="en-US" smtClean="0"/>
               <a:pPr/>
-              <a:t>1/8/2023</a:t>
+              <a:t>1/9/2023</a:t>
             </a:fld>
             <a:endParaRPr lang="en-US"/>
           </a:p>
@@ -2503,7 +2503,7 @@
             <a:fld id="{1D8BD707-D9CF-40AE-B4C6-C98DA3205C09}" type="datetimeFigureOut">
               <a:rPr lang="en-US" smtClean="0"/>
               <a:pPr/>
-              <a:t>1/8/2023</a:t>
+              <a:t>1/9/2023</a:t>
             </a:fld>
             <a:endParaRPr lang="en-US"/>
           </a:p>
@@ -2711,7 +2711,7 @@
             <a:fld id="{1D8BD707-D9CF-40AE-B4C6-C98DA3205C09}" type="datetimeFigureOut">
               <a:rPr lang="en-US" smtClean="0"/>
               <a:pPr/>
-              <a:t>1/8/2023</a:t>
+              <a:t>1/9/2023</a:t>
             </a:fld>
             <a:endParaRPr lang="en-US"/>
           </a:p>
@@ -3416,7 +3416,7 @@
         <p:spPr>
           <a:xfrm>
             <a:off x="1298282" y="2920905"/>
-            <a:ext cx="11231686" cy="4445191"/>
+            <a:ext cx="11231686" cy="5091522"/>
           </a:xfrm>
           <a:prstGeom prst="rect">
             <a:avLst/>
@@ -3628,6 +3628,57 @@
               <a:latin typeface="微軟正黑體" panose="020B0604030504040204" pitchFamily="34" charset="-120"/>
               <a:ea typeface="微軟正黑體" panose="020B0604030504040204" pitchFamily="34" charset="-120"/>
             </a:endParaRPr>
+          </a:p>
+          <a:p>
+            <a:pPr>
+              <a:lnSpc>
+                <a:spcPct val="150000"/>
+              </a:lnSpc>
+            </a:pPr>
+            <a:r>
+              <a:rPr lang="en-US" altLang="zh-TW" sz="2800" b="1" i="0" spc="300" dirty="0" err="1">
+                <a:solidFill>
+                  <a:srgbClr val="D1D5DB"/>
+                </a:solidFill>
+                <a:effectLst/>
+                <a:latin typeface="微軟正黑體" panose="020B0604030504040204" pitchFamily="34" charset="-120"/>
+                <a:ea typeface="微軟正黑體" panose="020B0604030504040204" pitchFamily="34" charset="-120"/>
+              </a:rPr>
+              <a:t>keyboard.up</a:t>
+            </a:r>
+            <a:r>
+              <a:rPr lang="en-US" altLang="zh-TW" sz="2800" b="1" i="0" spc="300" dirty="0">
+                <a:solidFill>
+                  <a:srgbClr val="D1D5DB"/>
+                </a:solidFill>
+                <a:effectLst/>
+                <a:latin typeface="微軟正黑體" panose="020B0604030504040204" pitchFamily="34" charset="-120"/>
+                <a:ea typeface="微軟正黑體" panose="020B0604030504040204" pitchFamily="34" charset="-120"/>
+              </a:rPr>
+              <a:t>		: 	</a:t>
+            </a:r>
+            <a:r>
+              <a:rPr lang="zh-TW" altLang="en-US" sz="2800" b="1" i="0" spc="300" dirty="0">
+                <a:solidFill>
+                  <a:srgbClr val="D1D5DB"/>
+                </a:solidFill>
+                <a:effectLst/>
+                <a:latin typeface="微軟正黑體" panose="020B0604030504040204" pitchFamily="34" charset="-120"/>
+                <a:ea typeface="微軟正黑體" panose="020B0604030504040204" pitchFamily="34" charset="-120"/>
+              </a:rPr>
+              <a:t>開始遊戲</a:t>
+            </a:r>
+            <a:r>
+              <a:rPr lang="en-US" altLang="zh-TW" sz="2800" b="1" i="0" spc="300" dirty="0">
+                <a:solidFill>
+                  <a:srgbClr val="D1D5DB"/>
+                </a:solidFill>
+                <a:effectLst/>
+                <a:latin typeface="微軟正黑體" panose="020B0604030504040204" pitchFamily="34" charset="-120"/>
+                <a:ea typeface="微軟正黑體" panose="020B0604030504040204" pitchFamily="34" charset="-120"/>
+              </a:rPr>
+              <a:t>	</a:t>
+            </a:r>
           </a:p>
           <a:p>
             <a:pPr>
@@ -4752,7 +4803,7 @@
                 </a:solidFill>
                 <a:latin typeface="Poppins Bold"/>
               </a:rPr>
-              <a:t>Main</a:t>
+              <a:t>Game</a:t>
             </a:r>
             <a:endParaRPr lang="en-US" sz="5599" dirty="0">
               <a:solidFill>
@@ -4808,7 +4859,7 @@
                 <a:latin typeface="微軟正黑體" panose="020B0604030504040204" pitchFamily="34" charset="-120"/>
                 <a:ea typeface="微軟正黑體" panose="020B0604030504040204" pitchFamily="34" charset="-120"/>
               </a:rPr>
-              <a:t>控制器、地形、玩家、障礙物，菜機可以根據選轉的角度透過</a:t>
+              <a:t>控制器、地形、玩家、障礙物，菜機可以根據</a:t>
             </a:r>
             <a:r>
               <a:rPr lang="en-US" altLang="zh-TW" sz="2800" b="1" spc="300" dirty="0">
@@ -4818,11 +4869,18 @@
               <a:t>PD</a:t>
             </a:r>
             <a:r>
+              <a:rPr lang="zh-TW" altLang="en-US" sz="2800" b="1" spc="300">
+                <a:latin typeface="微軟正黑體" panose="020B0604030504040204" pitchFamily="34" charset="-120"/>
+                <a:ea typeface="微軟正黑體" panose="020B0604030504040204" pitchFamily="34" charset="-120"/>
+              </a:rPr>
+              <a:t>控制器控制旋轉</a:t>
+            </a:r>
+            <a:r>
               <a:rPr lang="zh-TW" altLang="en-US" sz="2800" b="1" spc="300" dirty="0">
                 <a:latin typeface="微軟正黑體" panose="020B0604030504040204" pitchFamily="34" charset="-120"/>
                 <a:ea typeface="微軟正黑體" panose="020B0604030504040204" pitchFamily="34" charset="-120"/>
               </a:rPr>
-              <a:t>控制器控制。地形則會根據玩家當前的位置在前方隨機生成，並保證一定有可通過的路線。</a:t>
+              <a:t>的角度。地形則會根據玩家當前的位置在前方隨機生成，並保證一定有可通過的路線。</a:t>
             </a:r>
           </a:p>
         </p:txBody>

</xml_diff>